<commit_message>
updated diagram with fixed MUXLookup wire
</commit_message>
<xml_diff>
--- a/MyRISC Diagram.pptx
+++ b/MyRISC Diagram.pptx
@@ -259,7 +259,7 @@
           <a:p>
             <a:fld id="{47961E41-110E-4A07-9DE5-4C8279F3C039}" type="datetimeFigureOut">
               <a:rPr lang="en-US" smtClean="0"/>
-              <a:t>2/24/2021</a:t>
+              <a:t>2/26/2021</a:t>
             </a:fld>
             <a:endParaRPr lang="en-US"/>
           </a:p>
@@ -457,7 +457,7 @@
           <a:p>
             <a:fld id="{47961E41-110E-4A07-9DE5-4C8279F3C039}" type="datetimeFigureOut">
               <a:rPr lang="en-US" smtClean="0"/>
-              <a:t>2/24/2021</a:t>
+              <a:t>2/26/2021</a:t>
             </a:fld>
             <a:endParaRPr lang="en-US"/>
           </a:p>
@@ -665,7 +665,7 @@
           <a:p>
             <a:fld id="{47961E41-110E-4A07-9DE5-4C8279F3C039}" type="datetimeFigureOut">
               <a:rPr lang="en-US" smtClean="0"/>
-              <a:t>2/24/2021</a:t>
+              <a:t>2/26/2021</a:t>
             </a:fld>
             <a:endParaRPr lang="en-US"/>
           </a:p>
@@ -863,7 +863,7 @@
           <a:p>
             <a:fld id="{47961E41-110E-4A07-9DE5-4C8279F3C039}" type="datetimeFigureOut">
               <a:rPr lang="en-US" smtClean="0"/>
-              <a:t>2/24/2021</a:t>
+              <a:t>2/26/2021</a:t>
             </a:fld>
             <a:endParaRPr lang="en-US"/>
           </a:p>
@@ -1138,7 +1138,7 @@
           <a:p>
             <a:fld id="{47961E41-110E-4A07-9DE5-4C8279F3C039}" type="datetimeFigureOut">
               <a:rPr lang="en-US" smtClean="0"/>
-              <a:t>2/24/2021</a:t>
+              <a:t>2/26/2021</a:t>
             </a:fld>
             <a:endParaRPr lang="en-US"/>
           </a:p>
@@ -1403,7 +1403,7 @@
           <a:p>
             <a:fld id="{47961E41-110E-4A07-9DE5-4C8279F3C039}" type="datetimeFigureOut">
               <a:rPr lang="en-US" smtClean="0"/>
-              <a:t>2/24/2021</a:t>
+              <a:t>2/26/2021</a:t>
             </a:fld>
             <a:endParaRPr lang="en-US"/>
           </a:p>
@@ -1815,7 +1815,7 @@
           <a:p>
             <a:fld id="{47961E41-110E-4A07-9DE5-4C8279F3C039}" type="datetimeFigureOut">
               <a:rPr lang="en-US" smtClean="0"/>
-              <a:t>2/24/2021</a:t>
+              <a:t>2/26/2021</a:t>
             </a:fld>
             <a:endParaRPr lang="en-US"/>
           </a:p>
@@ -1956,7 +1956,7 @@
           <a:p>
             <a:fld id="{47961E41-110E-4A07-9DE5-4C8279F3C039}" type="datetimeFigureOut">
               <a:rPr lang="en-US" smtClean="0"/>
-              <a:t>2/24/2021</a:t>
+              <a:t>2/26/2021</a:t>
             </a:fld>
             <a:endParaRPr lang="en-US"/>
           </a:p>
@@ -2069,7 +2069,7 @@
           <a:p>
             <a:fld id="{47961E41-110E-4A07-9DE5-4C8279F3C039}" type="datetimeFigureOut">
               <a:rPr lang="en-US" smtClean="0"/>
-              <a:t>2/24/2021</a:t>
+              <a:t>2/26/2021</a:t>
             </a:fld>
             <a:endParaRPr lang="en-US"/>
           </a:p>
@@ -2380,7 +2380,7 @@
           <a:p>
             <a:fld id="{47961E41-110E-4A07-9DE5-4C8279F3C039}" type="datetimeFigureOut">
               <a:rPr lang="en-US" smtClean="0"/>
-              <a:t>2/24/2021</a:t>
+              <a:t>2/26/2021</a:t>
             </a:fld>
             <a:endParaRPr lang="en-US"/>
           </a:p>
@@ -2668,7 +2668,7 @@
           <a:p>
             <a:fld id="{47961E41-110E-4A07-9DE5-4C8279F3C039}" type="datetimeFigureOut">
               <a:rPr lang="en-US" smtClean="0"/>
-              <a:t>2/24/2021</a:t>
+              <a:t>2/26/2021</a:t>
             </a:fld>
             <a:endParaRPr lang="en-US"/>
           </a:p>
@@ -2909,7 +2909,7 @@
           <a:p>
             <a:fld id="{47961E41-110E-4A07-9DE5-4C8279F3C039}" type="datetimeFigureOut">
               <a:rPr lang="en-US" smtClean="0"/>
-              <a:t>2/24/2021</a:t>
+              <a:t>2/26/2021</a:t>
             </a:fld>
             <a:endParaRPr lang="en-US"/>
           </a:p>
@@ -6276,8 +6276,8 @@
         </p:nvGrpSpPr>
         <p:grpSpPr>
           <a:xfrm>
-            <a:off x="6321288" y="2781060"/>
-            <a:ext cx="655704" cy="169277"/>
+            <a:off x="6425422" y="2781060"/>
+            <a:ext cx="551570" cy="169277"/>
             <a:chOff x="2583809" y="1955213"/>
             <a:chExt cx="1074690" cy="315567"/>
           </a:xfrm>
@@ -9870,28 +9870,25 @@
         </p:nvCxnSpPr>
         <p:spPr>
           <a:xfrm>
-            <a:off x="4752021" y="4802755"/>
-            <a:ext cx="0" cy="359737"/>
+            <a:off x="4745782" y="4647390"/>
+            <a:ext cx="6239" cy="515102"/>
           </a:xfrm>
           <a:prstGeom prst="straightConnector1">
             <a:avLst/>
           </a:prstGeom>
           <a:ln>
-            <a:solidFill>
-              <a:srgbClr val="FF0000"/>
-            </a:solidFill>
             <a:tailEnd type="triangle"/>
           </a:ln>
         </p:spPr>
         <p:style>
           <a:lnRef idx="1">
-            <a:schemeClr val="accent2"/>
+            <a:schemeClr val="accent1"/>
           </a:lnRef>
           <a:fillRef idx="0">
-            <a:schemeClr val="accent2"/>
+            <a:schemeClr val="accent1"/>
           </a:fillRef>
           <a:effectRef idx="0">
-            <a:schemeClr val="accent2"/>
+            <a:schemeClr val="accent1"/>
           </a:effectRef>
           <a:fontRef idx="minor">
             <a:schemeClr val="tx1"/>
@@ -9928,18 +9925,28 @@
           <a:p>
             <a:r>
               <a:rPr lang="en-US" sz="500" dirty="0" err="1">
-                <a:solidFill>
-                  <a:srgbClr val="FF0000"/>
-                </a:solidFill>
+                <a:ln w="0"/>
+                <a:effectLst>
+                  <a:outerShdw blurRad="38100" dist="19050" dir="2700000" algn="tl" rotWithShape="0">
+                    <a:schemeClr val="dk1">
+                      <a:alpha val="40000"/>
+                    </a:schemeClr>
+                  </a:outerShdw>
+                </a:effectLst>
                 <a:latin typeface="Courier New" panose="02070309020205020404" pitchFamily="49" charset="0"/>
                 <a:cs typeface="Courier New" panose="02070309020205020404" pitchFamily="49" charset="0"/>
               </a:rPr>
               <a:t>MUXLookup</a:t>
             </a:r>
             <a:endParaRPr lang="en-US" sz="500" dirty="0">
-              <a:solidFill>
-                <a:srgbClr val="FF0000"/>
-              </a:solidFill>
+              <a:ln w="0"/>
+              <a:effectLst>
+                <a:outerShdw blurRad="38100" dist="19050" dir="2700000" algn="tl" rotWithShape="0">
+                  <a:schemeClr val="dk1">
+                    <a:alpha val="40000"/>
+                  </a:schemeClr>
+                </a:outerShdw>
+              </a:effectLst>
               <a:latin typeface="Courier New" panose="02070309020205020404" pitchFamily="49" charset="0"/>
               <a:cs typeface="Courier New" panose="02070309020205020404" pitchFamily="49" charset="0"/>
             </a:endParaRPr>
@@ -13023,6 +13030,183 @@
             </a:solidFill>
             <a:tailEnd type="triangle"/>
           </a:ln>
+        </p:spPr>
+        <p:style>
+          <a:lnRef idx="1">
+            <a:schemeClr val="accent1"/>
+          </a:lnRef>
+          <a:fillRef idx="0">
+            <a:schemeClr val="accent1"/>
+          </a:fillRef>
+          <a:effectRef idx="0">
+            <a:schemeClr val="accent1"/>
+          </a:effectRef>
+          <a:fontRef idx="minor">
+            <a:schemeClr val="tx1"/>
+          </a:fontRef>
+        </p:style>
+      </p:cxnSp>
+      <p:grpSp>
+        <p:nvGrpSpPr>
+          <p:cNvPr id="257" name="Group 256">
+            <a:extLst>
+              <a:ext uri="{FF2B5EF4-FFF2-40B4-BE49-F238E27FC236}">
+                <a16:creationId xmlns:a16="http://schemas.microsoft.com/office/drawing/2014/main" id="{3DC92771-45D4-4C96-AE83-1C8EDAD512F4}"/>
+              </a:ext>
+            </a:extLst>
+          </p:cNvPr>
+          <p:cNvGrpSpPr/>
+          <p:nvPr/>
+        </p:nvGrpSpPr>
+        <p:grpSpPr>
+          <a:xfrm>
+            <a:off x="5645984" y="1598265"/>
+            <a:ext cx="741806" cy="169277"/>
+            <a:chOff x="5670724" y="712864"/>
+            <a:chExt cx="741806" cy="169277"/>
+          </a:xfrm>
+        </p:grpSpPr>
+        <p:cxnSp>
+          <p:nvCxnSpPr>
+            <p:cNvPr id="258" name="Straight Connector 257">
+              <a:extLst>
+                <a:ext uri="{FF2B5EF4-FFF2-40B4-BE49-F238E27FC236}">
+                  <a16:creationId xmlns:a16="http://schemas.microsoft.com/office/drawing/2014/main" id="{67170920-D53D-4DF8-8F85-A06EE7601F2A}"/>
+                </a:ext>
+              </a:extLst>
+            </p:cNvPr>
+            <p:cNvCxnSpPr>
+              <a:cxnSpLocks/>
+            </p:cNvCxnSpPr>
+            <p:nvPr/>
+          </p:nvCxnSpPr>
+          <p:spPr>
+            <a:xfrm flipV="1">
+              <a:off x="5670724" y="838491"/>
+              <a:ext cx="623400" cy="1"/>
+            </a:xfrm>
+            <a:prstGeom prst="line">
+              <a:avLst/>
+            </a:prstGeom>
+          </p:spPr>
+          <p:style>
+            <a:lnRef idx="1">
+              <a:schemeClr val="accent1"/>
+            </a:lnRef>
+            <a:fillRef idx="0">
+              <a:schemeClr val="accent1"/>
+            </a:fillRef>
+            <a:effectRef idx="0">
+              <a:schemeClr val="accent1"/>
+            </a:effectRef>
+            <a:fontRef idx="minor">
+              <a:schemeClr val="tx1"/>
+            </a:fontRef>
+          </p:style>
+        </p:cxnSp>
+        <p:sp>
+          <p:nvSpPr>
+            <p:cNvPr id="259" name="TextBox 258">
+              <a:extLst>
+                <a:ext uri="{FF2B5EF4-FFF2-40B4-BE49-F238E27FC236}">
+                  <a16:creationId xmlns:a16="http://schemas.microsoft.com/office/drawing/2014/main" id="{6905E985-23D1-455B-9599-9171A3B422BF}"/>
+                </a:ext>
+              </a:extLst>
+            </p:cNvPr>
+            <p:cNvSpPr txBox="1"/>
+            <p:nvPr/>
+          </p:nvSpPr>
+          <p:spPr>
+            <a:xfrm>
+              <a:off x="5779470" y="712864"/>
+              <a:ext cx="633060" cy="169277"/>
+            </a:xfrm>
+            <a:prstGeom prst="rect">
+              <a:avLst/>
+            </a:prstGeom>
+            <a:noFill/>
+          </p:spPr>
+          <p:txBody>
+            <a:bodyPr wrap="square" rtlCol="0">
+              <a:spAutoFit/>
+            </a:bodyPr>
+            <a:lstStyle/>
+            <a:p>
+              <a:r>
+                <a:rPr lang="en-US" sz="500" dirty="0" err="1">
+                  <a:latin typeface="Courier New" panose="02070309020205020404" pitchFamily="49" charset="0"/>
+                  <a:cs typeface="Courier New" panose="02070309020205020404" pitchFamily="49" charset="0"/>
+                </a:rPr>
+                <a:t>MUXLookup</a:t>
+              </a:r>
+              <a:endParaRPr lang="en-US" sz="500" dirty="0">
+                <a:latin typeface="Courier New" panose="02070309020205020404" pitchFamily="49" charset="0"/>
+                <a:cs typeface="Courier New" panose="02070309020205020404" pitchFamily="49" charset="0"/>
+              </a:endParaRPr>
+            </a:p>
+          </p:txBody>
+        </p:sp>
+      </p:grpSp>
+      <p:cxnSp>
+        <p:nvCxnSpPr>
+          <p:cNvPr id="262" name="Straight Connector 261">
+            <a:extLst>
+              <a:ext uri="{FF2B5EF4-FFF2-40B4-BE49-F238E27FC236}">
+                <a16:creationId xmlns:a16="http://schemas.microsoft.com/office/drawing/2014/main" id="{008DA3F4-B8BE-41D6-8E8A-AE0DDE499BD6}"/>
+              </a:ext>
+            </a:extLst>
+          </p:cNvPr>
+          <p:cNvCxnSpPr>
+            <a:cxnSpLocks/>
+          </p:cNvCxnSpPr>
+          <p:nvPr/>
+        </p:nvCxnSpPr>
+        <p:spPr>
+          <a:xfrm>
+            <a:off x="6265587" y="1730819"/>
+            <a:ext cx="3618" cy="2932965"/>
+          </a:xfrm>
+          <a:prstGeom prst="line">
+            <a:avLst/>
+          </a:prstGeom>
+        </p:spPr>
+        <p:style>
+          <a:lnRef idx="1">
+            <a:schemeClr val="accent1"/>
+          </a:lnRef>
+          <a:fillRef idx="0">
+            <a:schemeClr val="accent1"/>
+          </a:fillRef>
+          <a:effectRef idx="0">
+            <a:schemeClr val="accent1"/>
+          </a:effectRef>
+          <a:fontRef idx="minor">
+            <a:schemeClr val="tx1"/>
+          </a:fontRef>
+        </p:style>
+      </p:cxnSp>
+      <p:cxnSp>
+        <p:nvCxnSpPr>
+          <p:cNvPr id="263" name="Straight Connector 262">
+            <a:extLst>
+              <a:ext uri="{FF2B5EF4-FFF2-40B4-BE49-F238E27FC236}">
+                <a16:creationId xmlns:a16="http://schemas.microsoft.com/office/drawing/2014/main" id="{E8254671-C326-4907-9778-EEA921CAE915}"/>
+              </a:ext>
+            </a:extLst>
+          </p:cNvPr>
+          <p:cNvCxnSpPr>
+            <a:cxnSpLocks/>
+          </p:cNvCxnSpPr>
+          <p:nvPr/>
+        </p:nvCxnSpPr>
+        <p:spPr>
+          <a:xfrm>
+            <a:off x="4745782" y="4647390"/>
+            <a:ext cx="1525475" cy="9580"/>
+          </a:xfrm>
+          <a:prstGeom prst="line">
+            <a:avLst/>
+          </a:prstGeom>
         </p:spPr>
         <p:style>
           <a:lnRef idx="1">

</xml_diff>